<commit_message>
Documentação e script finalizados
</commit_message>
<xml_diff>
--- a/space_infinity/apresentação.pptx
+++ b/space_infinity/apresentação.pptx
@@ -114,8 +114,40 @@
         </p14:section>
       </p14:sectionLst>
     </p:ext>
+    <p:ext uri="{EFAFB233-063F-42B5-8137-9DF3F51BA10A}">
+      <p15:sldGuideLst xmlns:p15="http://schemas.microsoft.com/office/powerpoint/2012/main"/>
+    </p:ext>
   </p:extLst>
 </p:presentation>
+</file>
+
+<file path=ppt/changesInfos/changesInfo1.xml><?xml version="1.0" encoding="utf-8"?>
+<pc:chgInfo xmlns:a="http://schemas.openxmlformats.org/drawingml/2006/main" xmlns:r="http://schemas.openxmlformats.org/officeDocument/2006/relationships" xmlns:ac="http://schemas.microsoft.com/office/drawing/2013/main/command" xmlns:pc="http://schemas.microsoft.com/office/powerpoint/2013/main/command">
+  <pc:docChgLst>
+    <pc:chgData name="Nicolly Juliani" userId="253ddd4071b1850b" providerId="LiveId" clId="{DB808729-7E24-4E14-A3BF-9D9DE64C96D2}"/>
+    <pc:docChg chg="modSld">
+      <pc:chgData name="Nicolly Juliani" userId="253ddd4071b1850b" providerId="LiveId" clId="{DB808729-7E24-4E14-A3BF-9D9DE64C96D2}" dt="2023-06-04T03:06:27.511" v="0" actId="1076"/>
+      <pc:docMkLst>
+        <pc:docMk/>
+      </pc:docMkLst>
+      <pc:sldChg chg="modSp mod">
+        <pc:chgData name="Nicolly Juliani" userId="253ddd4071b1850b" providerId="LiveId" clId="{DB808729-7E24-4E14-A3BF-9D9DE64C96D2}" dt="2023-06-04T03:06:27.511" v="0" actId="1076"/>
+        <pc:sldMkLst>
+          <pc:docMk/>
+          <pc:sldMk cId="2339646589" sldId="256"/>
+        </pc:sldMkLst>
+        <pc:spChg chg="mod">
+          <ac:chgData name="Nicolly Juliani" userId="253ddd4071b1850b" providerId="LiveId" clId="{DB808729-7E24-4E14-A3BF-9D9DE64C96D2}" dt="2023-06-04T03:06:27.511" v="0" actId="1076"/>
+          <ac:spMkLst>
+            <pc:docMk/>
+            <pc:sldMk cId="2339646589" sldId="256"/>
+            <ac:spMk id="2" creationId="{BA74F3B9-BC7D-5749-D2F3-90FFE7B67574}"/>
+          </ac:spMkLst>
+        </pc:spChg>
+      </pc:sldChg>
+    </pc:docChg>
+  </pc:docChgLst>
+</pc:chgInfo>
 </file>
 
 <file path=ppt/slideLayouts/slideLayout1.xml><?xml version="1.0" encoding="utf-8"?>
@@ -265,7 +297,7 @@
           <a:p>
             <a:fld id="{4C02F568-DCF6-4988-8C89-1D538288B8B6}" type="datetimeFigureOut">
               <a:rPr lang="pt-BR" smtClean="0"/>
-              <a:t>30/05/2023</a:t>
+              <a:t>04/06/2023</a:t>
             </a:fld>
             <a:endParaRPr lang="pt-BR"/>
           </a:p>
@@ -463,7 +495,7 @@
           <a:p>
             <a:fld id="{4C02F568-DCF6-4988-8C89-1D538288B8B6}" type="datetimeFigureOut">
               <a:rPr lang="pt-BR" smtClean="0"/>
-              <a:t>30/05/2023</a:t>
+              <a:t>04/06/2023</a:t>
             </a:fld>
             <a:endParaRPr lang="pt-BR"/>
           </a:p>
@@ -671,7 +703,7 @@
           <a:p>
             <a:fld id="{4C02F568-DCF6-4988-8C89-1D538288B8B6}" type="datetimeFigureOut">
               <a:rPr lang="pt-BR" smtClean="0"/>
-              <a:t>30/05/2023</a:t>
+              <a:t>04/06/2023</a:t>
             </a:fld>
             <a:endParaRPr lang="pt-BR"/>
           </a:p>
@@ -869,7 +901,7 @@
           <a:p>
             <a:fld id="{4C02F568-DCF6-4988-8C89-1D538288B8B6}" type="datetimeFigureOut">
               <a:rPr lang="pt-BR" smtClean="0"/>
-              <a:t>30/05/2023</a:t>
+              <a:t>04/06/2023</a:t>
             </a:fld>
             <a:endParaRPr lang="pt-BR"/>
           </a:p>
@@ -1144,7 +1176,7 @@
           <a:p>
             <a:fld id="{4C02F568-DCF6-4988-8C89-1D538288B8B6}" type="datetimeFigureOut">
               <a:rPr lang="pt-BR" smtClean="0"/>
-              <a:t>30/05/2023</a:t>
+              <a:t>04/06/2023</a:t>
             </a:fld>
             <a:endParaRPr lang="pt-BR"/>
           </a:p>
@@ -1409,7 +1441,7 @@
           <a:p>
             <a:fld id="{4C02F568-DCF6-4988-8C89-1D538288B8B6}" type="datetimeFigureOut">
               <a:rPr lang="pt-BR" smtClean="0"/>
-              <a:t>30/05/2023</a:t>
+              <a:t>04/06/2023</a:t>
             </a:fld>
             <a:endParaRPr lang="pt-BR"/>
           </a:p>
@@ -1821,7 +1853,7 @@
           <a:p>
             <a:fld id="{4C02F568-DCF6-4988-8C89-1D538288B8B6}" type="datetimeFigureOut">
               <a:rPr lang="pt-BR" smtClean="0"/>
-              <a:t>30/05/2023</a:t>
+              <a:t>04/06/2023</a:t>
             </a:fld>
             <a:endParaRPr lang="pt-BR"/>
           </a:p>
@@ -1962,7 +1994,7 @@
           <a:p>
             <a:fld id="{4C02F568-DCF6-4988-8C89-1D538288B8B6}" type="datetimeFigureOut">
               <a:rPr lang="pt-BR" smtClean="0"/>
-              <a:t>30/05/2023</a:t>
+              <a:t>04/06/2023</a:t>
             </a:fld>
             <a:endParaRPr lang="pt-BR"/>
           </a:p>
@@ -2075,7 +2107,7 @@
           <a:p>
             <a:fld id="{4C02F568-DCF6-4988-8C89-1D538288B8B6}" type="datetimeFigureOut">
               <a:rPr lang="pt-BR" smtClean="0"/>
-              <a:t>30/05/2023</a:t>
+              <a:t>04/06/2023</a:t>
             </a:fld>
             <a:endParaRPr lang="pt-BR"/>
           </a:p>
@@ -2386,7 +2418,7 @@
           <a:p>
             <a:fld id="{4C02F568-DCF6-4988-8C89-1D538288B8B6}" type="datetimeFigureOut">
               <a:rPr lang="pt-BR" smtClean="0"/>
-              <a:t>30/05/2023</a:t>
+              <a:t>04/06/2023</a:t>
             </a:fld>
             <a:endParaRPr lang="pt-BR"/>
           </a:p>
@@ -2674,7 +2706,7 @@
           <a:p>
             <a:fld id="{4C02F568-DCF6-4988-8C89-1D538288B8B6}" type="datetimeFigureOut">
               <a:rPr lang="pt-BR" smtClean="0"/>
-              <a:t>30/05/2023</a:t>
+              <a:t>04/06/2023</a:t>
             </a:fld>
             <a:endParaRPr lang="pt-BR"/>
           </a:p>
@@ -2915,7 +2947,7 @@
           <a:p>
             <a:fld id="{4C02F568-DCF6-4988-8C89-1D538288B8B6}" type="datetimeFigureOut">
               <a:rPr lang="pt-BR" smtClean="0"/>
-              <a:t>30/05/2023</a:t>
+              <a:t>04/06/2023</a:t>
             </a:fld>
             <a:endParaRPr lang="pt-BR"/>
           </a:p>
@@ -3364,7 +3396,7 @@
         </p:nvSpPr>
         <p:spPr>
           <a:xfrm>
-            <a:off x="1071716" y="868362"/>
+            <a:off x="442452" y="581156"/>
             <a:ext cx="9144000" cy="2387600"/>
           </a:xfrm>
         </p:spPr>

</xml_diff>